<commit_message>
Added Challenges and info about the calendar and form
</commit_message>
<xml_diff>
--- a/Presentation.pptx
+++ b/Presentation.pptx
@@ -19,6 +19,7 @@
     <p:sldId id="270" r:id="rId13"/>
     <p:sldId id="268" r:id="rId14"/>
     <p:sldId id="269" r:id="rId15"/>
+    <p:sldId id="271" r:id="rId16"/>
   </p:sldIdLst>
   <p:sldSz cx="9144000" cy="6858000" type="screen4x3"/>
   <p:notesSz cx="6858000" cy="9144000"/>
@@ -301,7 +302,7 @@
           <a:p>
             <a:fld id="{CDA55791-C2D1-764D-BBBD-B74F41DCF41D}" type="datetimeFigureOut">
               <a:rPr lang="en-US" smtClean="0"/>
-              <a:t>9/8/15</a:t>
+              <a:t>9/9/15</a:t>
             </a:fld>
             <a:endParaRPr lang="en-US"/>
           </a:p>
@@ -471,7 +472,7 @@
           <a:p>
             <a:fld id="{CDA55791-C2D1-764D-BBBD-B74F41DCF41D}" type="datetimeFigureOut">
               <a:rPr lang="en-US" smtClean="0"/>
-              <a:t>9/8/15</a:t>
+              <a:t>9/9/15</a:t>
             </a:fld>
             <a:endParaRPr lang="en-US"/>
           </a:p>
@@ -651,7 +652,7 @@
           <a:p>
             <a:fld id="{CDA55791-C2D1-764D-BBBD-B74F41DCF41D}" type="datetimeFigureOut">
               <a:rPr lang="en-US" smtClean="0"/>
-              <a:t>9/8/15</a:t>
+              <a:t>9/9/15</a:t>
             </a:fld>
             <a:endParaRPr lang="en-US"/>
           </a:p>
@@ -821,7 +822,7 @@
           <a:p>
             <a:fld id="{CDA55791-C2D1-764D-BBBD-B74F41DCF41D}" type="datetimeFigureOut">
               <a:rPr lang="en-US" smtClean="0"/>
-              <a:t>9/8/15</a:t>
+              <a:t>9/9/15</a:t>
             </a:fld>
             <a:endParaRPr lang="en-US"/>
           </a:p>
@@ -1067,7 +1068,7 @@
           <a:p>
             <a:fld id="{CDA55791-C2D1-764D-BBBD-B74F41DCF41D}" type="datetimeFigureOut">
               <a:rPr lang="en-US" smtClean="0"/>
-              <a:t>9/8/15</a:t>
+              <a:t>9/9/15</a:t>
             </a:fld>
             <a:endParaRPr lang="en-US"/>
           </a:p>
@@ -1355,7 +1356,7 @@
           <a:p>
             <a:fld id="{CDA55791-C2D1-764D-BBBD-B74F41DCF41D}" type="datetimeFigureOut">
               <a:rPr lang="en-US" smtClean="0"/>
-              <a:t>9/8/15</a:t>
+              <a:t>9/9/15</a:t>
             </a:fld>
             <a:endParaRPr lang="en-US"/>
           </a:p>
@@ -1777,7 +1778,7 @@
           <a:p>
             <a:fld id="{CDA55791-C2D1-764D-BBBD-B74F41DCF41D}" type="datetimeFigureOut">
               <a:rPr lang="en-US" smtClean="0"/>
-              <a:t>9/8/15</a:t>
+              <a:t>9/9/15</a:t>
             </a:fld>
             <a:endParaRPr lang="en-US"/>
           </a:p>
@@ -1895,7 +1896,7 @@
           <a:p>
             <a:fld id="{CDA55791-C2D1-764D-BBBD-B74F41DCF41D}" type="datetimeFigureOut">
               <a:rPr lang="en-US" smtClean="0"/>
-              <a:t>9/8/15</a:t>
+              <a:t>9/9/15</a:t>
             </a:fld>
             <a:endParaRPr lang="en-US"/>
           </a:p>
@@ -1990,7 +1991,7 @@
           <a:p>
             <a:fld id="{CDA55791-C2D1-764D-BBBD-B74F41DCF41D}" type="datetimeFigureOut">
               <a:rPr lang="en-US" smtClean="0"/>
-              <a:t>9/8/15</a:t>
+              <a:t>9/9/15</a:t>
             </a:fld>
             <a:endParaRPr lang="en-US"/>
           </a:p>
@@ -2267,7 +2268,7 @@
           <a:p>
             <a:fld id="{CDA55791-C2D1-764D-BBBD-B74F41DCF41D}" type="datetimeFigureOut">
               <a:rPr lang="en-US" smtClean="0"/>
-              <a:t>9/8/15</a:t>
+              <a:t>9/9/15</a:t>
             </a:fld>
             <a:endParaRPr lang="en-US"/>
           </a:p>
@@ -2520,7 +2521,7 @@
           <a:p>
             <a:fld id="{CDA55791-C2D1-764D-BBBD-B74F41DCF41D}" type="datetimeFigureOut">
               <a:rPr lang="en-US" smtClean="0"/>
-              <a:t>9/8/15</a:t>
+              <a:t>9/9/15</a:t>
             </a:fld>
             <a:endParaRPr lang="en-US"/>
           </a:p>
@@ -2738,7 +2739,7 @@
           <a:p>
             <a:fld id="{CDA55791-C2D1-764D-BBBD-B74F41DCF41D}" type="datetimeFigureOut">
               <a:rPr lang="en-US" smtClean="0"/>
-              <a:t>9/8/15</a:t>
+              <a:t>9/9/15</a:t>
             </a:fld>
             <a:endParaRPr lang="en-US"/>
           </a:p>
@@ -3267,8 +3268,44 @@
           <a:p>
             <a:r>
               <a:rPr lang="en-US" dirty="0" smtClean="0"/>
-              <a:t>IT manager implied we would be given access to a development server, but were not given access</a:t>
-            </a:r>
+              <a:t>Communication was difficult</a:t>
+            </a:r>
+          </a:p>
+          <a:p>
+            <a:pPr lvl="1"/>
+            <a:r>
+              <a:rPr lang="en-US" dirty="0" smtClean="0"/>
+              <a:t>Distance is a plausible factor</a:t>
+            </a:r>
+          </a:p>
+          <a:p>
+            <a:r>
+              <a:rPr lang="en-US" dirty="0" smtClean="0"/>
+              <a:t>IT </a:t>
+            </a:r>
+            <a:r>
+              <a:rPr lang="en-US" dirty="0" smtClean="0"/>
+              <a:t>manager implied we would be given access to a development server, </a:t>
+            </a:r>
+            <a:r>
+              <a:rPr lang="en-US" dirty="0" smtClean="0"/>
+              <a:t>but was later revoked</a:t>
+            </a:r>
+          </a:p>
+          <a:p>
+            <a:r>
+              <a:rPr lang="en-US" dirty="0" smtClean="0"/>
+              <a:t>Familiarizing ourselves with languages hindered progress </a:t>
+            </a:r>
+          </a:p>
+          <a:p>
+            <a:r>
+              <a:rPr lang="en-US" dirty="0" smtClean="0"/>
+              <a:t>Changing design</a:t>
+            </a:r>
+          </a:p>
+          <a:p>
+            <a:endParaRPr lang="en-US" dirty="0" smtClean="0"/>
           </a:p>
           <a:p>
             <a:pPr marL="0" indent="0">
@@ -3365,7 +3402,11 @@
             <a:pPr lvl="1"/>
             <a:r>
               <a:rPr lang="en-US" dirty="0" smtClean="0"/>
-              <a:t>Instead of creating a visual calendar that may be hard to see, we implemented a date selection form with dropdown options.</a:t>
+              <a:t>Instead of creating a visual calendar that may be hard to see, we implemented a date selection form with dropdown options</a:t>
+            </a:r>
+            <a:r>
+              <a:rPr lang="en-US" dirty="0" smtClean="0"/>
+              <a:t>.</a:t>
             </a:r>
           </a:p>
           <a:p>
@@ -3380,6 +3421,30 @@
           </a:p>
         </p:txBody>
       </p:sp>
+      <p:pic>
+        <p:nvPicPr>
+          <p:cNvPr id="4" name="Picture 3"/>
+          <p:cNvPicPr>
+            <a:picLocks noChangeAspect="1"/>
+          </p:cNvPicPr>
+          <p:nvPr/>
+        </p:nvPicPr>
+        <p:blipFill>
+          <a:blip r:embed="rId3"/>
+          <a:stretch>
+            <a:fillRect/>
+          </a:stretch>
+        </p:blipFill>
+        <p:spPr>
+          <a:xfrm>
+            <a:off x="1330561" y="4197342"/>
+            <a:ext cx="6273820" cy="1647065"/>
+          </a:xfrm>
+          <a:prstGeom prst="rect">
+            <a:avLst/>
+          </a:prstGeom>
+        </p:spPr>
+      </p:pic>
     </p:spTree>
     <p:extLst>
       <p:ext uri="{BB962C8B-B14F-4D97-AF65-F5344CB8AC3E}">
@@ -3460,45 +3525,49 @@
           <a:p>
             <a:r>
               <a:rPr lang="en-US" dirty="0" smtClean="0"/>
-              <a:t>After </a:t>
-            </a:r>
-            <a:r>
-              <a:rPr lang="en-US" dirty="0"/>
-              <a:t>D</a:t>
-            </a:r>
-            <a:r>
-              <a:rPr lang="en-US" dirty="0" smtClean="0"/>
-              <a:t>ate Selection Calendar Includes 3 Options:</a:t>
-            </a:r>
+              <a:t>Once a date is selected the user has the multiple options to choose from</a:t>
+            </a:r>
+            <a:r>
+              <a:rPr lang="en-US" dirty="0" smtClean="0"/>
+              <a:t>:</a:t>
+            </a:r>
+            <a:endParaRPr lang="en-US" dirty="0" smtClean="0"/>
           </a:p>
           <a:p>
             <a:pPr lvl="1"/>
             <a:r>
-              <a:rPr lang="en-US" dirty="0" smtClean="0"/>
-              <a:t>Option 1 (Get Reservations)</a:t>
-            </a:r>
+              <a:rPr lang="en-US" u="sng" dirty="0" smtClean="0"/>
+              <a:t>Get Reservations</a:t>
+            </a:r>
+            <a:r>
+              <a:rPr lang="en-US" dirty="0" smtClean="0"/>
+              <a:t>– which looks at the day selected and see all the reservations all put in.</a:t>
+            </a:r>
+            <a:endParaRPr lang="en-US" dirty="0" smtClean="0"/>
           </a:p>
           <a:p>
             <a:pPr lvl="1"/>
             <a:r>
-              <a:rPr lang="en-US" dirty="0" smtClean="0"/>
-              <a:t>Option 2 (</a:t>
-            </a:r>
+              <a:rPr lang="en-US" u="sng" dirty="0" smtClean="0"/>
+              <a:t>Get Driver Availability</a:t>
+            </a:r>
+            <a:r>
+              <a:rPr lang="en-US" dirty="0" smtClean="0"/>
+              <a:t> – which check to see if there is any driver free or currently working a that moment.</a:t>
+            </a:r>
+            <a:endParaRPr lang="en-US" dirty="0" smtClean="0"/>
           </a:p>
           <a:p>
             <a:pPr lvl="1"/>
             <a:r>
-              <a:rPr lang="en-US" smtClean="0"/>
-              <a:t>Option 3 (</a:t>
+              <a:rPr lang="en-US" u="sng" dirty="0" smtClean="0"/>
+              <a:t>Get Vehicle Availability</a:t>
+            </a:r>
+            <a:r>
+              <a:rPr lang="en-US" dirty="0" smtClean="0"/>
+              <a:t> – which sees if there is any service vehicles are no in use.</a:t>
             </a:r>
             <a:endParaRPr lang="en-US" dirty="0" smtClean="0"/>
-          </a:p>
-          <a:p>
-            <a:pPr lvl="2"/>
-            <a:r>
-              <a:rPr lang="en-US" dirty="0" smtClean="0"/>
-              <a:t>Links to the Reservation Page</a:t>
-            </a:r>
           </a:p>
           <a:p>
             <a:pPr marL="457200" lvl="1" indent="0">
@@ -3580,10 +3649,52 @@
           <a:bodyPr/>
           <a:lstStyle/>
           <a:p>
+            <a:r>
+              <a:rPr lang="en-US" dirty="0" smtClean="0"/>
+              <a:t>Now if there is not a reservation and one is needed, the user simple selects the “Make a new Reservation” link</a:t>
+            </a:r>
+          </a:p>
+          <a:p>
+            <a:pPr lvl="1"/>
+            <a:r>
+              <a:rPr lang="en-US" dirty="0" smtClean="0"/>
+              <a:t>Doing this directly send th</a:t>
+            </a:r>
+            <a:r>
+              <a:rPr lang="en-US" dirty="0" smtClean="0"/>
+              <a:t>e user to the form that will be filled out</a:t>
+            </a:r>
+          </a:p>
+          <a:p>
+            <a:pPr lvl="1"/>
             <a:endParaRPr lang="en-US" dirty="0"/>
           </a:p>
         </p:txBody>
       </p:sp>
+      <p:pic>
+        <p:nvPicPr>
+          <p:cNvPr id="4" name="Picture 3"/>
+          <p:cNvPicPr>
+            <a:picLocks noChangeAspect="1"/>
+          </p:cNvPicPr>
+          <p:nvPr/>
+        </p:nvPicPr>
+        <p:blipFill>
+          <a:blip r:embed="rId2"/>
+          <a:stretch>
+            <a:fillRect/>
+          </a:stretch>
+        </p:blipFill>
+        <p:spPr>
+          <a:xfrm>
+            <a:off x="2181675" y="4244852"/>
+            <a:ext cx="4571354" cy="1660754"/>
+          </a:xfrm>
+          <a:prstGeom prst="rect">
+            <a:avLst/>
+          </a:prstGeom>
+        </p:spPr>
+      </p:pic>
     </p:spTree>
     <p:extLst>
       <p:ext uri="{BB962C8B-B14F-4D97-AF65-F5344CB8AC3E}">
@@ -3629,7 +3740,11 @@
           <a:bodyPr/>
           <a:lstStyle/>
           <a:p>
-            <a:endParaRPr lang="en-US"/>
+            <a:r>
+              <a:rPr lang="en-US" dirty="0" smtClean="0"/>
+              <a:t>Form</a:t>
+            </a:r>
+            <a:endParaRPr lang="en-US" dirty="0"/>
           </a:p>
         </p:txBody>
       </p:sp>
@@ -3643,12 +3758,420 @@
             <p:ph idx="1"/>
           </p:nvPr>
         </p:nvSpPr>
-        <p:spPr/>
-        <p:txBody>
-          <a:bodyPr/>
-          <a:lstStyle/>
-          <a:p>
-            <a:endParaRPr lang="en-US"/>
+        <p:spPr>
+          <a:xfrm>
+            <a:off x="457200" y="1600201"/>
+            <a:ext cx="8229600" cy="2178776"/>
+          </a:xfrm>
+        </p:spPr>
+        <p:txBody>
+          <a:bodyPr/>
+          <a:lstStyle/>
+          <a:p>
+            <a:r>
+              <a:rPr lang="en-US" dirty="0" smtClean="0"/>
+              <a:t>When the user reaches the form, they will be asked a few necessary questions in-order to proceed and create a reservation.</a:t>
+            </a:r>
+          </a:p>
+          <a:p>
+            <a:r>
+              <a:rPr lang="en-US" dirty="0" smtClean="0"/>
+              <a:t>Some general questions are like</a:t>
+            </a:r>
+          </a:p>
+        </p:txBody>
+      </p:sp>
+      <p:sp>
+        <p:nvSpPr>
+          <p:cNvPr id="4" name="Content Placeholder 2"/>
+          <p:cNvSpPr txBox="1">
+            <a:spLocks/>
+          </p:cNvSpPr>
+          <p:nvPr/>
+        </p:nvSpPr>
+        <p:spPr>
+          <a:xfrm>
+            <a:off x="609600" y="4124023"/>
+            <a:ext cx="4133575" cy="2178776"/>
+          </a:xfrm>
+          <a:prstGeom prst="rect">
+            <a:avLst/>
+          </a:prstGeom>
+        </p:spPr>
+        <p:txBody>
+          <a:bodyPr vert="horz" lIns="91440" tIns="45720" rIns="91440" bIns="45720" rtlCol="0">
+            <a:normAutofit/>
+          </a:bodyPr>
+          <a:lstStyle>
+            <a:lvl1pPr marL="342900" indent="-342900" algn="l" defTabSz="457200" rtl="0" eaLnBrk="1" latinLnBrk="0" hangingPunct="1">
+              <a:spcBef>
+                <a:spcPct val="20000"/>
+              </a:spcBef>
+              <a:buFont typeface="Arial"/>
+              <a:buChar char="•"/>
+              <a:defRPr sz="3200" kern="1200">
+                <a:solidFill>
+                  <a:schemeClr val="tx1"/>
+                </a:solidFill>
+                <a:latin typeface="+mn-lt"/>
+                <a:ea typeface="+mn-ea"/>
+                <a:cs typeface="+mn-cs"/>
+              </a:defRPr>
+            </a:lvl1pPr>
+            <a:lvl2pPr marL="742950" indent="-285750" algn="l" defTabSz="457200" rtl="0" eaLnBrk="1" latinLnBrk="0" hangingPunct="1">
+              <a:spcBef>
+                <a:spcPct val="20000"/>
+              </a:spcBef>
+              <a:buFont typeface="Arial"/>
+              <a:buChar char="–"/>
+              <a:defRPr sz="2800" kern="1200">
+                <a:solidFill>
+                  <a:schemeClr val="tx1"/>
+                </a:solidFill>
+                <a:latin typeface="+mn-lt"/>
+                <a:ea typeface="+mn-ea"/>
+                <a:cs typeface="+mn-cs"/>
+              </a:defRPr>
+            </a:lvl2pPr>
+            <a:lvl3pPr marL="1143000" indent="-228600" algn="l" defTabSz="457200" rtl="0" eaLnBrk="1" latinLnBrk="0" hangingPunct="1">
+              <a:spcBef>
+                <a:spcPct val="20000"/>
+              </a:spcBef>
+              <a:buFont typeface="Arial"/>
+              <a:buChar char="•"/>
+              <a:defRPr sz="2400" kern="1200">
+                <a:solidFill>
+                  <a:schemeClr val="tx1"/>
+                </a:solidFill>
+                <a:latin typeface="+mn-lt"/>
+                <a:ea typeface="+mn-ea"/>
+                <a:cs typeface="+mn-cs"/>
+              </a:defRPr>
+            </a:lvl3pPr>
+            <a:lvl4pPr marL="1600200" indent="-228600" algn="l" defTabSz="457200" rtl="0" eaLnBrk="1" latinLnBrk="0" hangingPunct="1">
+              <a:spcBef>
+                <a:spcPct val="20000"/>
+              </a:spcBef>
+              <a:buFont typeface="Arial"/>
+              <a:buChar char="–"/>
+              <a:defRPr sz="2000" kern="1200">
+                <a:solidFill>
+                  <a:schemeClr val="tx1"/>
+                </a:solidFill>
+                <a:latin typeface="+mn-lt"/>
+                <a:ea typeface="+mn-ea"/>
+                <a:cs typeface="+mn-cs"/>
+              </a:defRPr>
+            </a:lvl4pPr>
+            <a:lvl5pPr marL="2057400" indent="-228600" algn="l" defTabSz="457200" rtl="0" eaLnBrk="1" latinLnBrk="0" hangingPunct="1">
+              <a:spcBef>
+                <a:spcPct val="20000"/>
+              </a:spcBef>
+              <a:buFont typeface="Arial"/>
+              <a:buChar char="»"/>
+              <a:defRPr sz="2000" kern="1200">
+                <a:solidFill>
+                  <a:schemeClr val="tx1"/>
+                </a:solidFill>
+                <a:latin typeface="+mn-lt"/>
+                <a:ea typeface="+mn-ea"/>
+                <a:cs typeface="+mn-cs"/>
+              </a:defRPr>
+            </a:lvl5pPr>
+            <a:lvl6pPr marL="2514600" indent="-228600" algn="l" defTabSz="457200" rtl="0" eaLnBrk="1" latinLnBrk="0" hangingPunct="1">
+              <a:spcBef>
+                <a:spcPct val="20000"/>
+              </a:spcBef>
+              <a:buFont typeface="Arial"/>
+              <a:buChar char="•"/>
+              <a:defRPr sz="2000" kern="1200">
+                <a:solidFill>
+                  <a:schemeClr val="tx1"/>
+                </a:solidFill>
+                <a:latin typeface="+mn-lt"/>
+                <a:ea typeface="+mn-ea"/>
+                <a:cs typeface="+mn-cs"/>
+              </a:defRPr>
+            </a:lvl6pPr>
+            <a:lvl7pPr marL="2971800" indent="-228600" algn="l" defTabSz="457200" rtl="0" eaLnBrk="1" latinLnBrk="0" hangingPunct="1">
+              <a:spcBef>
+                <a:spcPct val="20000"/>
+              </a:spcBef>
+              <a:buFont typeface="Arial"/>
+              <a:buChar char="•"/>
+              <a:defRPr sz="2000" kern="1200">
+                <a:solidFill>
+                  <a:schemeClr val="tx1"/>
+                </a:solidFill>
+                <a:latin typeface="+mn-lt"/>
+                <a:ea typeface="+mn-ea"/>
+                <a:cs typeface="+mn-cs"/>
+              </a:defRPr>
+            </a:lvl7pPr>
+            <a:lvl8pPr marL="3429000" indent="-228600" algn="l" defTabSz="457200" rtl="0" eaLnBrk="1" latinLnBrk="0" hangingPunct="1">
+              <a:spcBef>
+                <a:spcPct val="20000"/>
+              </a:spcBef>
+              <a:buFont typeface="Arial"/>
+              <a:buChar char="•"/>
+              <a:defRPr sz="2000" kern="1200">
+                <a:solidFill>
+                  <a:schemeClr val="tx1"/>
+                </a:solidFill>
+                <a:latin typeface="+mn-lt"/>
+                <a:ea typeface="+mn-ea"/>
+                <a:cs typeface="+mn-cs"/>
+              </a:defRPr>
+            </a:lvl8pPr>
+            <a:lvl9pPr marL="3886200" indent="-228600" algn="l" defTabSz="457200" rtl="0" eaLnBrk="1" latinLnBrk="0" hangingPunct="1">
+              <a:spcBef>
+                <a:spcPct val="20000"/>
+              </a:spcBef>
+              <a:buFont typeface="Arial"/>
+              <a:buChar char="•"/>
+              <a:defRPr sz="2000" kern="1200">
+                <a:solidFill>
+                  <a:schemeClr val="tx1"/>
+                </a:solidFill>
+                <a:latin typeface="+mn-lt"/>
+                <a:ea typeface="+mn-ea"/>
+                <a:cs typeface="+mn-cs"/>
+              </a:defRPr>
+            </a:lvl9pPr>
+          </a:lstStyle>
+          <a:p>
+            <a:endParaRPr lang="en-US" dirty="0" smtClean="0"/>
+          </a:p>
+        </p:txBody>
+      </p:sp>
+      <p:sp>
+        <p:nvSpPr>
+          <p:cNvPr id="5" name="Content Placeholder 2"/>
+          <p:cNvSpPr txBox="1">
+            <a:spLocks/>
+          </p:cNvSpPr>
+          <p:nvPr/>
+        </p:nvSpPr>
+        <p:spPr>
+          <a:xfrm>
+            <a:off x="609600" y="3747190"/>
+            <a:ext cx="8077200" cy="2418508"/>
+          </a:xfrm>
+          <a:prstGeom prst="rect">
+            <a:avLst/>
+          </a:prstGeom>
+        </p:spPr>
+        <p:txBody>
+          <a:bodyPr vert="horz" lIns="91440" tIns="45720" rIns="91440" bIns="45720" numCol="2" rtlCol="0">
+            <a:normAutofit lnSpcReduction="10000"/>
+          </a:bodyPr>
+          <a:lstStyle>
+            <a:lvl1pPr marL="342900" indent="-342900" algn="l" defTabSz="457200" rtl="0" eaLnBrk="1" latinLnBrk="0" hangingPunct="1">
+              <a:spcBef>
+                <a:spcPct val="20000"/>
+              </a:spcBef>
+              <a:buFont typeface="Arial"/>
+              <a:buChar char="•"/>
+              <a:defRPr sz="3200" kern="1200">
+                <a:solidFill>
+                  <a:schemeClr val="tx1"/>
+                </a:solidFill>
+                <a:latin typeface="+mn-lt"/>
+                <a:ea typeface="+mn-ea"/>
+                <a:cs typeface="+mn-cs"/>
+              </a:defRPr>
+            </a:lvl1pPr>
+            <a:lvl2pPr marL="742950" indent="-285750" algn="l" defTabSz="457200" rtl="0" eaLnBrk="1" latinLnBrk="0" hangingPunct="1">
+              <a:spcBef>
+                <a:spcPct val="20000"/>
+              </a:spcBef>
+              <a:buFont typeface="Arial"/>
+              <a:buChar char="–"/>
+              <a:defRPr sz="2800" kern="1200">
+                <a:solidFill>
+                  <a:schemeClr val="tx1"/>
+                </a:solidFill>
+                <a:latin typeface="+mn-lt"/>
+                <a:ea typeface="+mn-ea"/>
+                <a:cs typeface="+mn-cs"/>
+              </a:defRPr>
+            </a:lvl2pPr>
+            <a:lvl3pPr marL="1143000" indent="-228600" algn="l" defTabSz="457200" rtl="0" eaLnBrk="1" latinLnBrk="0" hangingPunct="1">
+              <a:spcBef>
+                <a:spcPct val="20000"/>
+              </a:spcBef>
+              <a:buFont typeface="Arial"/>
+              <a:buChar char="•"/>
+              <a:defRPr sz="2400" kern="1200">
+                <a:solidFill>
+                  <a:schemeClr val="tx1"/>
+                </a:solidFill>
+                <a:latin typeface="+mn-lt"/>
+                <a:ea typeface="+mn-ea"/>
+                <a:cs typeface="+mn-cs"/>
+              </a:defRPr>
+            </a:lvl3pPr>
+            <a:lvl4pPr marL="1600200" indent="-228600" algn="l" defTabSz="457200" rtl="0" eaLnBrk="1" latinLnBrk="0" hangingPunct="1">
+              <a:spcBef>
+                <a:spcPct val="20000"/>
+              </a:spcBef>
+              <a:buFont typeface="Arial"/>
+              <a:buChar char="–"/>
+              <a:defRPr sz="2000" kern="1200">
+                <a:solidFill>
+                  <a:schemeClr val="tx1"/>
+                </a:solidFill>
+                <a:latin typeface="+mn-lt"/>
+                <a:ea typeface="+mn-ea"/>
+                <a:cs typeface="+mn-cs"/>
+              </a:defRPr>
+            </a:lvl4pPr>
+            <a:lvl5pPr marL="2057400" indent="-228600" algn="l" defTabSz="457200" rtl="0" eaLnBrk="1" latinLnBrk="0" hangingPunct="1">
+              <a:spcBef>
+                <a:spcPct val="20000"/>
+              </a:spcBef>
+              <a:buFont typeface="Arial"/>
+              <a:buChar char="»"/>
+              <a:defRPr sz="2000" kern="1200">
+                <a:solidFill>
+                  <a:schemeClr val="tx1"/>
+                </a:solidFill>
+                <a:latin typeface="+mn-lt"/>
+                <a:ea typeface="+mn-ea"/>
+                <a:cs typeface="+mn-cs"/>
+              </a:defRPr>
+            </a:lvl5pPr>
+            <a:lvl6pPr marL="2514600" indent="-228600" algn="l" defTabSz="457200" rtl="0" eaLnBrk="1" latinLnBrk="0" hangingPunct="1">
+              <a:spcBef>
+                <a:spcPct val="20000"/>
+              </a:spcBef>
+              <a:buFont typeface="Arial"/>
+              <a:buChar char="•"/>
+              <a:defRPr sz="2000" kern="1200">
+                <a:solidFill>
+                  <a:schemeClr val="tx1"/>
+                </a:solidFill>
+                <a:latin typeface="+mn-lt"/>
+                <a:ea typeface="+mn-ea"/>
+                <a:cs typeface="+mn-cs"/>
+              </a:defRPr>
+            </a:lvl6pPr>
+            <a:lvl7pPr marL="2971800" indent="-228600" algn="l" defTabSz="457200" rtl="0" eaLnBrk="1" latinLnBrk="0" hangingPunct="1">
+              <a:spcBef>
+                <a:spcPct val="20000"/>
+              </a:spcBef>
+              <a:buFont typeface="Arial"/>
+              <a:buChar char="•"/>
+              <a:defRPr sz="2000" kern="1200">
+                <a:solidFill>
+                  <a:schemeClr val="tx1"/>
+                </a:solidFill>
+                <a:latin typeface="+mn-lt"/>
+                <a:ea typeface="+mn-ea"/>
+                <a:cs typeface="+mn-cs"/>
+              </a:defRPr>
+            </a:lvl7pPr>
+            <a:lvl8pPr marL="3429000" indent="-228600" algn="l" defTabSz="457200" rtl="0" eaLnBrk="1" latinLnBrk="0" hangingPunct="1">
+              <a:spcBef>
+                <a:spcPct val="20000"/>
+              </a:spcBef>
+              <a:buFont typeface="Arial"/>
+              <a:buChar char="•"/>
+              <a:defRPr sz="2000" kern="1200">
+                <a:solidFill>
+                  <a:schemeClr val="tx1"/>
+                </a:solidFill>
+                <a:latin typeface="+mn-lt"/>
+                <a:ea typeface="+mn-ea"/>
+                <a:cs typeface="+mn-cs"/>
+              </a:defRPr>
+            </a:lvl8pPr>
+            <a:lvl9pPr marL="3886200" indent="-228600" algn="l" defTabSz="457200" rtl="0" eaLnBrk="1" latinLnBrk="0" hangingPunct="1">
+              <a:spcBef>
+                <a:spcPct val="20000"/>
+              </a:spcBef>
+              <a:buFont typeface="Arial"/>
+              <a:buChar char="•"/>
+              <a:defRPr sz="2000" kern="1200">
+                <a:solidFill>
+                  <a:schemeClr val="tx1"/>
+                </a:solidFill>
+                <a:latin typeface="+mn-lt"/>
+                <a:ea typeface="+mn-ea"/>
+                <a:cs typeface="+mn-cs"/>
+              </a:defRPr>
+            </a:lvl9pPr>
+          </a:lstStyle>
+          <a:p>
+            <a:pPr lvl="1"/>
+            <a:r>
+              <a:rPr lang="en-US" dirty="0" smtClean="0"/>
+              <a:t>Client Name</a:t>
+            </a:r>
+          </a:p>
+          <a:p>
+            <a:pPr lvl="1"/>
+            <a:r>
+              <a:rPr lang="en-US" dirty="0" smtClean="0"/>
+              <a:t>Disability</a:t>
+            </a:r>
+          </a:p>
+          <a:p>
+            <a:pPr lvl="1"/>
+            <a:r>
+              <a:rPr lang="en-US" dirty="0" smtClean="0"/>
+              <a:t>Emergency Contact Information</a:t>
+            </a:r>
+          </a:p>
+          <a:p>
+            <a:pPr lvl="1"/>
+            <a:r>
+              <a:rPr lang="en-US" dirty="0" smtClean="0"/>
+              <a:t>Pickup Location</a:t>
+            </a:r>
+          </a:p>
+          <a:p>
+            <a:pPr lvl="1"/>
+            <a:r>
+              <a:rPr lang="en-US" dirty="0"/>
+              <a:t>Pickup </a:t>
+            </a:r>
+            <a:r>
+              <a:rPr lang="en-US" dirty="0" smtClean="0"/>
+              <a:t>Time</a:t>
+            </a:r>
+            <a:endParaRPr lang="en-US" dirty="0"/>
+          </a:p>
+          <a:p>
+            <a:pPr lvl="1"/>
+            <a:r>
+              <a:rPr lang="en-US" dirty="0"/>
+              <a:t>Reason for Appointment</a:t>
+            </a:r>
+          </a:p>
+          <a:p>
+            <a:pPr lvl="1"/>
+            <a:r>
+              <a:rPr lang="en-US" dirty="0"/>
+              <a:t>Drop-off </a:t>
+            </a:r>
+            <a:r>
+              <a:rPr lang="en-US" dirty="0" smtClean="0"/>
+              <a:t>Location</a:t>
+            </a:r>
+            <a:endParaRPr lang="en-US" dirty="0"/>
+          </a:p>
+          <a:p>
+            <a:pPr lvl="1"/>
+            <a:r>
+              <a:rPr lang="en-US" dirty="0"/>
+              <a:t>New </a:t>
+            </a:r>
+            <a:r>
+              <a:rPr lang="en-US" dirty="0" smtClean="0"/>
+              <a:t>Patient</a:t>
+            </a:r>
+            <a:endParaRPr lang="en-US" dirty="0"/>
           </a:p>
         </p:txBody>
       </p:sp>
@@ -3656,6 +4179,107 @@
     <p:extLst>
       <p:ext uri="{BB962C8B-B14F-4D97-AF65-F5344CB8AC3E}">
         <p14:creationId xmlns:p14="http://schemas.microsoft.com/office/powerpoint/2010/main" val="1145143467"/>
+      </p:ext>
+    </p:extLst>
+  </p:cSld>
+  <p:clrMapOvr>
+    <a:masterClrMapping/>
+  </p:clrMapOvr>
+</p:sld>
+</file>
+
+<file path=ppt/slides/slide15.xml><?xml version="1.0" encoding="utf-8"?>
+<p:sld xmlns:a="http://schemas.openxmlformats.org/drawingml/2006/main" xmlns:r="http://schemas.openxmlformats.org/officeDocument/2006/relationships" xmlns:p="http://schemas.openxmlformats.org/presentationml/2006/main">
+  <p:cSld>
+    <p:spTree>
+      <p:nvGrpSpPr>
+        <p:cNvPr id="1" name=""/>
+        <p:cNvGrpSpPr/>
+        <p:nvPr/>
+      </p:nvGrpSpPr>
+      <p:grpSpPr>
+        <a:xfrm>
+          <a:off x="0" y="0"/>
+          <a:ext cx="0" cy="0"/>
+          <a:chOff x="0" y="0"/>
+          <a:chExt cx="0" cy="0"/>
+        </a:xfrm>
+      </p:grpSpPr>
+      <p:sp>
+        <p:nvSpPr>
+          <p:cNvPr id="2" name="Title 1"/>
+          <p:cNvSpPr>
+            <a:spLocks noGrp="1"/>
+          </p:cNvSpPr>
+          <p:nvPr>
+            <p:ph type="title"/>
+          </p:nvPr>
+        </p:nvSpPr>
+        <p:spPr/>
+        <p:txBody>
+          <a:bodyPr/>
+          <a:lstStyle/>
+          <a:p>
+            <a:r>
+              <a:rPr lang="en-US" dirty="0" smtClean="0"/>
+              <a:t>Form</a:t>
+            </a:r>
+            <a:endParaRPr lang="en-US" dirty="0"/>
+          </a:p>
+        </p:txBody>
+      </p:sp>
+      <p:pic>
+        <p:nvPicPr>
+          <p:cNvPr id="5" name="Content Placeholder 4"/>
+          <p:cNvPicPr>
+            <a:picLocks noGrp="1" noChangeAspect="1"/>
+          </p:cNvPicPr>
+          <p:nvPr>
+            <p:ph idx="1"/>
+          </p:nvPr>
+        </p:nvPicPr>
+        <p:blipFill>
+          <a:blip r:embed="rId2"/>
+          <a:srcRect l="-36732" r="-36732"/>
+          <a:stretch>
+            <a:fillRect/>
+          </a:stretch>
+        </p:blipFill>
+        <p:spPr>
+          <a:xfrm>
+            <a:off x="-1730781" y="1417638"/>
+            <a:ext cx="8229600" cy="4525963"/>
+          </a:xfrm>
+        </p:spPr>
+      </p:pic>
+      <p:pic>
+        <p:nvPicPr>
+          <p:cNvPr id="6" name="Picture 5"/>
+          <p:cNvPicPr>
+            <a:picLocks noChangeAspect="1"/>
+          </p:cNvPicPr>
+          <p:nvPr/>
+        </p:nvPicPr>
+        <p:blipFill>
+          <a:blip r:embed="rId3"/>
+          <a:stretch>
+            <a:fillRect/>
+          </a:stretch>
+        </p:blipFill>
+        <p:spPr>
+          <a:xfrm>
+            <a:off x="4672897" y="1417637"/>
+            <a:ext cx="4471103" cy="4525963"/>
+          </a:xfrm>
+          <a:prstGeom prst="rect">
+            <a:avLst/>
+          </a:prstGeom>
+        </p:spPr>
+      </p:pic>
+    </p:spTree>
+    <p:extLst>
+      <p:ext uri="{BB962C8B-B14F-4D97-AF65-F5344CB8AC3E}">
+        <p14:creationId xmlns:p14="http://schemas.microsoft.com/office/powerpoint/2010/main" val="740609544"/>
       </p:ext>
     </p:extLst>
   </p:cSld>
@@ -3992,7 +4616,6 @@
               <a:rPr lang="en-US" dirty="0" smtClean="0"/>
               <a:t>Driver/Vehicle Determined upon reservation</a:t>
             </a:r>
-            <a:endParaRPr lang="en-US" dirty="0" smtClean="0"/>
           </a:p>
           <a:p>
             <a:pPr lvl="1"/>

</xml_diff>